<commit_message>
Webcasting + Notify Entrance
</commit_message>
<xml_diff>
--- a/ShookaDesktop Guide - Farsi.pptx
+++ b/ShookaDesktop Guide - Farsi.pptx
@@ -316,7 +316,7 @@
           <a:p>
             <a:fld id="{F32E560B-4F83-45FF-AAA0-7CF2EC396768}" type="datetimeFigureOut">
               <a:rPr lang="en-US" smtClean="0"/>
-              <a:t>8/24/2014</a:t>
+              <a:t>10/15/2014</a:t>
             </a:fld>
             <a:endParaRPr lang="en-US"/>
           </a:p>
@@ -486,7 +486,7 @@
           <a:p>
             <a:fld id="{F32E560B-4F83-45FF-AAA0-7CF2EC396768}" type="datetimeFigureOut">
               <a:rPr lang="en-US" smtClean="0"/>
-              <a:t>8/24/2014</a:t>
+              <a:t>10/15/2014</a:t>
             </a:fld>
             <a:endParaRPr lang="en-US"/>
           </a:p>
@@ -666,7 +666,7 @@
           <a:p>
             <a:fld id="{F32E560B-4F83-45FF-AAA0-7CF2EC396768}" type="datetimeFigureOut">
               <a:rPr lang="en-US" smtClean="0"/>
-              <a:t>8/24/2014</a:t>
+              <a:t>10/15/2014</a:t>
             </a:fld>
             <a:endParaRPr lang="en-US"/>
           </a:p>
@@ -836,7 +836,7 @@
           <a:p>
             <a:fld id="{F32E560B-4F83-45FF-AAA0-7CF2EC396768}" type="datetimeFigureOut">
               <a:rPr lang="en-US" smtClean="0"/>
-              <a:t>8/24/2014</a:t>
+              <a:t>10/15/2014</a:t>
             </a:fld>
             <a:endParaRPr lang="en-US"/>
           </a:p>
@@ -1082,7 +1082,7 @@
           <a:p>
             <a:fld id="{F32E560B-4F83-45FF-AAA0-7CF2EC396768}" type="datetimeFigureOut">
               <a:rPr lang="en-US" smtClean="0"/>
-              <a:t>8/24/2014</a:t>
+              <a:t>10/15/2014</a:t>
             </a:fld>
             <a:endParaRPr lang="en-US"/>
           </a:p>
@@ -1370,7 +1370,7 @@
           <a:p>
             <a:fld id="{F32E560B-4F83-45FF-AAA0-7CF2EC396768}" type="datetimeFigureOut">
               <a:rPr lang="en-US" smtClean="0"/>
-              <a:t>8/24/2014</a:t>
+              <a:t>10/15/2014</a:t>
             </a:fld>
             <a:endParaRPr lang="en-US"/>
           </a:p>
@@ -1792,7 +1792,7 @@
           <a:p>
             <a:fld id="{F32E560B-4F83-45FF-AAA0-7CF2EC396768}" type="datetimeFigureOut">
               <a:rPr lang="en-US" smtClean="0"/>
-              <a:t>8/24/2014</a:t>
+              <a:t>10/15/2014</a:t>
             </a:fld>
             <a:endParaRPr lang="en-US"/>
           </a:p>
@@ -1910,7 +1910,7 @@
           <a:p>
             <a:fld id="{F32E560B-4F83-45FF-AAA0-7CF2EC396768}" type="datetimeFigureOut">
               <a:rPr lang="en-US" smtClean="0"/>
-              <a:t>8/24/2014</a:t>
+              <a:t>10/15/2014</a:t>
             </a:fld>
             <a:endParaRPr lang="en-US"/>
           </a:p>
@@ -2005,7 +2005,7 @@
           <a:p>
             <a:fld id="{F32E560B-4F83-45FF-AAA0-7CF2EC396768}" type="datetimeFigureOut">
               <a:rPr lang="en-US" smtClean="0"/>
-              <a:t>8/24/2014</a:t>
+              <a:t>10/15/2014</a:t>
             </a:fld>
             <a:endParaRPr lang="en-US"/>
           </a:p>
@@ -2282,7 +2282,7 @@
           <a:p>
             <a:fld id="{F32E560B-4F83-45FF-AAA0-7CF2EC396768}" type="datetimeFigureOut">
               <a:rPr lang="en-US" smtClean="0"/>
-              <a:t>8/24/2014</a:t>
+              <a:t>10/15/2014</a:t>
             </a:fld>
             <a:endParaRPr lang="en-US"/>
           </a:p>
@@ -2535,7 +2535,7 @@
           <a:p>
             <a:fld id="{F32E560B-4F83-45FF-AAA0-7CF2EC396768}" type="datetimeFigureOut">
               <a:rPr lang="en-US" smtClean="0"/>
-              <a:t>8/24/2014</a:t>
+              <a:t>10/15/2014</a:t>
             </a:fld>
             <a:endParaRPr lang="en-US"/>
           </a:p>
@@ -2748,7 +2748,7 @@
           <a:p>
             <a:fld id="{F32E560B-4F83-45FF-AAA0-7CF2EC396768}" type="datetimeFigureOut">
               <a:rPr lang="en-US" smtClean="0"/>
-              <a:t>8/24/2014</a:t>
+              <a:t>10/15/2014</a:t>
             </a:fld>
             <a:endParaRPr lang="en-US"/>
           </a:p>
@@ -18433,25 +18433,7 @@
                 </a:solidFill>
                 <a:cs typeface="B Titr" pitchFamily="2" charset="-78"/>
               </a:rPr>
-              <a:t>بخش </a:t>
-            </a:r>
-            <a:r>
-              <a:rPr lang="fa-IR" sz="2800" dirty="0" smtClean="0">
-                <a:solidFill>
-                  <a:srgbClr val="0070C0"/>
-                </a:solidFill>
-                <a:cs typeface="B Titr" pitchFamily="2" charset="-78"/>
-              </a:rPr>
-              <a:t>ضبط کنفرانس سربرگ </a:t>
-            </a:r>
-            <a:r>
-              <a:rPr lang="fa-IR" sz="2800" dirty="0" smtClean="0">
-                <a:solidFill>
-                  <a:srgbClr val="0070C0"/>
-                </a:solidFill>
-                <a:cs typeface="B Titr" pitchFamily="2" charset="-78"/>
-              </a:rPr>
-              <a:t>تنظیمات</a:t>
+              <a:t>بخش ضبط کنفرانس سربرگ تنظیمات</a:t>
             </a:r>
             <a:endParaRPr lang="en-US" sz="2800" dirty="0"/>
           </a:p>
@@ -18775,12 +18757,41 @@
               </a:rPr>
               <a:t> وضعیت فعلی قابلیت ضبط کنفرانس – در صورت فعال نبودن روی دکمه فعالسازی که در زیر این نوشته ظاهر میشود کلیک کنید تا پس از دانلود خودکار به حجم 10 مگابایت، قابلیت ضبط کنفرانس فعال شود.</a:t>
             </a:r>
+          </a:p>
+          <a:p>
+            <a:pPr algn="just" rtl="1"/>
             <a:endParaRPr lang="fa-IR" sz="1400" dirty="0" smtClean="0">
               <a:cs typeface="B Nazanin" pitchFamily="2" charset="-78"/>
             </a:endParaRPr>
           </a:p>
           <a:p>
             <a:pPr algn="just" rtl="1"/>
+            <a:r>
+              <a:rPr lang="fa-IR" sz="1400" dirty="0" smtClean="0">
+                <a:solidFill>
+                  <a:srgbClr val="FF0000"/>
+                </a:solidFill>
+              </a:rPr>
+              <a:t>2-</a:t>
+            </a:r>
+            <a:r>
+              <a:rPr lang="fa-IR" sz="1400" dirty="0" smtClean="0">
+                <a:solidFill>
+                  <a:srgbClr val="FF0000"/>
+                </a:solidFill>
+                <a:cs typeface="B Nazanin" pitchFamily="2" charset="-78"/>
+              </a:rPr>
+              <a:t> </a:t>
+            </a:r>
+            <a:r>
+              <a:rPr lang="fa-IR" sz="1400" dirty="0" smtClean="0">
+                <a:cs typeface="B Nazanin" pitchFamily="2" charset="-78"/>
+              </a:rPr>
+              <a:t>نوع (فرمت) پیش فرض فایل ویدئویی خروجی ضبط شده از کنفرانس</a:t>
+            </a:r>
+          </a:p>
+          <a:p>
+            <a:pPr algn="just" rtl="1"/>
             <a:endParaRPr lang="fa-IR" sz="1400" dirty="0" smtClean="0">
               <a:cs typeface="B Nazanin" pitchFamily="2" charset="-78"/>
             </a:endParaRPr>
@@ -18793,107 +18804,66 @@
                   <a:srgbClr val="FF0000"/>
                 </a:solidFill>
               </a:rPr>
-              <a:t>2-</a:t>
-            </a:r>
-            <a:r>
-              <a:rPr lang="fa-IR" sz="1400" dirty="0" smtClean="0">
-                <a:solidFill>
-                  <a:srgbClr val="FF0000"/>
-                </a:solidFill>
-                <a:cs typeface="B Nazanin" pitchFamily="2" charset="-78"/>
-              </a:rPr>
-              <a:t> </a:t>
-            </a:r>
-            <a:r>
-              <a:rPr lang="fa-IR" sz="1400" dirty="0" smtClean="0">
-                <a:cs typeface="B Nazanin" pitchFamily="2" charset="-78"/>
-              </a:rPr>
-              <a:t>نوع (فرمت) پیش فرض فایل ویدئویی خروجی ضبط شده از کنفرانس</a:t>
-            </a:r>
+              <a:t>3- </a:t>
+            </a:r>
+            <a:r>
+              <a:rPr lang="fa-IR" sz="1400" dirty="0" smtClean="0">
+                <a:cs typeface="B Nazanin" pitchFamily="2" charset="-78"/>
+              </a:rPr>
+              <a:t>تعداد تصاویر ضبط شونده در ثانیه</a:t>
+            </a:r>
+          </a:p>
+          <a:p>
+            <a:pPr algn="just" rtl="1"/>
             <a:endParaRPr lang="fa-IR" sz="1400" dirty="0" smtClean="0">
               <a:cs typeface="B Nazanin" pitchFamily="2" charset="-78"/>
             </a:endParaRPr>
           </a:p>
           <a:p>
             <a:pPr algn="just" rtl="1"/>
+            <a:r>
+              <a:rPr lang="fa-IR" sz="1400" dirty="0" smtClean="0">
+                <a:solidFill>
+                  <a:srgbClr val="FF0000"/>
+                </a:solidFill>
+              </a:rPr>
+              <a:t>4-</a:t>
+            </a:r>
+            <a:r>
+              <a:rPr lang="fa-IR" sz="1400" dirty="0" smtClean="0">
+                <a:solidFill>
+                  <a:srgbClr val="FF0000"/>
+                </a:solidFill>
+                <a:cs typeface="B Nazanin" pitchFamily="2" charset="-78"/>
+              </a:rPr>
+              <a:t> </a:t>
+            </a:r>
+            <a:r>
+              <a:rPr lang="fa-IR" sz="1400" dirty="0" smtClean="0">
+                <a:cs typeface="B Nazanin" pitchFamily="2" charset="-78"/>
+              </a:rPr>
+              <a:t>اگر شما هم در جلسه حرف می‌زنید این گزینه را تیک بزنید تا صدای خودتان هم همراه با صدای سایر اعضای جلسه ضبط شود، اما اگر فقط برای ترتیب دادن جلسه یا ضبط آن وارد جلسه شده‌اید و قصد صحبت کردن ندارید تیک این گزینه را بردارید تا تنها  صدای سایرین ضبط شود نه صدای خودتان.</a:t>
+            </a:r>
+          </a:p>
+          <a:p>
+            <a:pPr algn="just" rtl="1"/>
+            <a:endParaRPr lang="fa-IR" sz="1400" dirty="0">
+              <a:cs typeface="B Nazanin" pitchFamily="2" charset="-78"/>
+            </a:endParaRPr>
+          </a:p>
+          <a:p>
+            <a:pPr algn="just" rtl="1"/>
             <a:endParaRPr lang="fa-IR" sz="1400" dirty="0" smtClean="0">
               <a:cs typeface="B Nazanin" pitchFamily="2" charset="-78"/>
             </a:endParaRPr>
           </a:p>
           <a:p>
             <a:pPr algn="just" rtl="1"/>
-            <a:r>
-              <a:rPr lang="fa-IR" sz="1400" dirty="0" smtClean="0">
-                <a:solidFill>
-                  <a:srgbClr val="FF0000"/>
-                </a:solidFill>
-              </a:rPr>
-              <a:t>3- </a:t>
-            </a:r>
-            <a:r>
-              <a:rPr lang="fa-IR" sz="1400" dirty="0" smtClean="0">
-                <a:cs typeface="B Nazanin" pitchFamily="2" charset="-78"/>
-              </a:rPr>
-              <a:t>تعداد تصاویر ضبط شونده در ثانیه</a:t>
-            </a:r>
-            <a:endParaRPr lang="fa-IR" sz="1400" dirty="0" smtClean="0">
-              <a:cs typeface="B Nazanin" pitchFamily="2" charset="-78"/>
-            </a:endParaRPr>
-          </a:p>
-          <a:p>
-            <a:pPr algn="just" rtl="1"/>
-            <a:endParaRPr lang="fa-IR" sz="1400" dirty="0" smtClean="0">
-              <a:cs typeface="B Nazanin" pitchFamily="2" charset="-78"/>
-            </a:endParaRPr>
-          </a:p>
-          <a:p>
-            <a:pPr algn="just" rtl="1"/>
-            <a:r>
-              <a:rPr lang="fa-IR" sz="1400" dirty="0" smtClean="0">
-                <a:solidFill>
-                  <a:srgbClr val="FF0000"/>
-                </a:solidFill>
-              </a:rPr>
-              <a:t>4-</a:t>
-            </a:r>
-            <a:r>
-              <a:rPr lang="fa-IR" sz="1400" dirty="0" smtClean="0">
-                <a:solidFill>
-                  <a:srgbClr val="FF0000"/>
-                </a:solidFill>
-                <a:cs typeface="B Nazanin" pitchFamily="2" charset="-78"/>
-              </a:rPr>
-              <a:t> </a:t>
-            </a:r>
-            <a:r>
-              <a:rPr lang="fa-IR" sz="1400" dirty="0" smtClean="0">
-                <a:cs typeface="B Nazanin" pitchFamily="2" charset="-78"/>
-              </a:rPr>
-              <a:t>اگر شما هم در جلسه حرف می‌زنید این گزینه را تیک بزنید تا صدای خودتان هم همراه با صدای سایر اعضای جلسه ضبط شود، اما اگر فقط برای ترتیب دادن جلسه یا ضبط آن وارد جلسه شده‌اید و قصد صحبت کردن ندارید تیک این گزینه را بردارید تا تنها  صدای سایرین ضبط شود نه صدای خودتان.</a:t>
-            </a:r>
-            <a:endParaRPr lang="fa-IR" sz="1400" dirty="0" smtClean="0">
-              <a:cs typeface="B Nazanin" pitchFamily="2" charset="-78"/>
-            </a:endParaRPr>
-          </a:p>
-          <a:p>
-            <a:pPr algn="just" rtl="1"/>
             <a:endParaRPr lang="fa-IR" sz="1400" dirty="0">
               <a:cs typeface="B Nazanin" pitchFamily="2" charset="-78"/>
             </a:endParaRPr>
           </a:p>
           <a:p>
-            <a:pPr algn="just" rtl="1"/>
-            <a:endParaRPr lang="fa-IR" sz="1400" dirty="0" smtClean="0">
-              <a:cs typeface="B Nazanin" pitchFamily="2" charset="-78"/>
-            </a:endParaRPr>
-          </a:p>
-          <a:p>
-            <a:pPr algn="just" rtl="1"/>
-            <a:endParaRPr lang="fa-IR" sz="1400" dirty="0">
-              <a:cs typeface="B Nazanin" pitchFamily="2" charset="-78"/>
-            </a:endParaRPr>
-          </a:p>
-          <a:p>
             <a:pPr algn="ctr" rtl="1"/>
             <a:r>
               <a:rPr lang="fa-IR" sz="1400" b="1" dirty="0" smtClean="0">
@@ -18958,12 +18928,6 @@
               </a:rPr>
               <a:t> تنها صدای کنفرانس ضبط خواهد شد نه تصویر آن اما با انتخاب سایر انواع ویدئوی صوتی و تصویری کنفرانس ضبط خواهد شد.</a:t>
             </a:r>
-            <a:endParaRPr lang="fa-IR" sz="1400" b="1" dirty="0" smtClean="0">
-              <a:solidFill>
-                <a:srgbClr val="7030A0"/>
-              </a:solidFill>
-              <a:cs typeface="B Nazanin" pitchFamily="2" charset="-78"/>
-            </a:endParaRPr>
           </a:p>
         </p:txBody>
       </p:sp>
@@ -20475,16 +20439,7 @@
                 </a:solidFill>
                 <a:cs typeface="B Nazanin" pitchFamily="2" charset="-78"/>
               </a:rPr>
-              <a:t>برای ارسال (یا مشاهده‌ی) پیام‌های متنی اعضای جلسه، بر روی این قسمت کلیک کنید</a:t>
-            </a:r>
-            <a:r>
-              <a:rPr lang="fa-IR" sz="1200" dirty="0" smtClean="0">
-                <a:solidFill>
-                  <a:schemeClr val="bg1"/>
-                </a:solidFill>
-                <a:cs typeface="B Nazanin" pitchFamily="2" charset="-78"/>
-              </a:rPr>
-              <a:t>.</a:t>
+              <a:t>برای ارسال (یا مشاهده‌ی) پیام‌های متنی اعضای جلسه، بر روی این قسمت کلیک کنید.</a:t>
             </a:r>
             <a:endParaRPr lang="en-US" sz="1200" dirty="0" smtClean="0">
               <a:solidFill>
@@ -20652,16 +20607,7 @@
                 </a:solidFill>
                 <a:cs typeface="B Nazanin" pitchFamily="2" charset="-78"/>
               </a:rPr>
-              <a:t>کلیک </a:t>
-            </a:r>
-            <a:r>
-              <a:rPr lang="fa-IR" sz="1200" dirty="0" smtClean="0">
-                <a:solidFill>
-                  <a:schemeClr val="bg1"/>
-                </a:solidFill>
-                <a:cs typeface="B Nazanin" pitchFamily="2" charset="-78"/>
-              </a:rPr>
-              <a:t>کنید.</a:t>
+              <a:t>کلیک کنید.</a:t>
             </a:r>
           </a:p>
           <a:p>

</xml_diff>